<commit_message>
slides / changes from session
</commit_message>
<xml_diff>
--- a/slides/AngularJS.pptx
+++ b/slides/AngularJS.pptx
@@ -5,7 +5,7 @@
     <p:sldMasterId id="2147483660" r:id="rId1"/>
   </p:sldMasterIdLst>
   <p:notesMasterIdLst>
-    <p:notesMasterId r:id="rId84"/>
+    <p:notesMasterId r:id="rId83"/>
   </p:notesMasterIdLst>
   <p:sldIdLst>
     <p:sldId id="256" r:id="rId2"/>
@@ -79,7 +79,7 @@
     <p:sldId id="323" r:id="rId70"/>
     <p:sldId id="329" r:id="rId71"/>
     <p:sldId id="330" r:id="rId72"/>
-    <p:sldId id="331" r:id="rId73"/>
+    <p:sldId id="340" r:id="rId73"/>
     <p:sldId id="328" r:id="rId74"/>
     <p:sldId id="332" r:id="rId75"/>
     <p:sldId id="335" r:id="rId76"/>
@@ -88,8 +88,7 @@
     <p:sldId id="334" r:id="rId79"/>
     <p:sldId id="337" r:id="rId80"/>
     <p:sldId id="338" r:id="rId81"/>
-    <p:sldId id="340" r:id="rId82"/>
-    <p:sldId id="339" r:id="rId83"/>
+    <p:sldId id="339" r:id="rId82"/>
   </p:sldIdLst>
   <p:sldSz cx="12192000" cy="6858000"/>
   <p:notesSz cx="6858000" cy="9144000"/>
@@ -288,7 +287,7 @@
             <p14:sldId id="323"/>
             <p14:sldId id="329"/>
             <p14:sldId id="330"/>
-            <p14:sldId id="331"/>
+            <p14:sldId id="340"/>
           </p14:sldIdLst>
         </p14:section>
         <p14:section name="Unit Testing" id="{9017A9B9-5F63-41A4-A252-4A84372F8F0A}">
@@ -301,7 +300,6 @@
             <p14:sldId id="334"/>
             <p14:sldId id="337"/>
             <p14:sldId id="338"/>
-            <p14:sldId id="340"/>
           </p14:sldIdLst>
         </p14:section>
         <p14:section name="Forms" id="{F0C8A9EA-AA9E-49D9-BFA0-80A714B2EB3B}">
@@ -400,7 +398,7 @@
           <a:p>
             <a:fld id="{4837C6CC-C2FC-4BED-8348-2E96B1BEB824}" type="datetimeFigureOut">
               <a:rPr lang="de-AT" smtClean="0"/>
-              <a:t>15.10.2015</a:t>
+              <a:t>21.10.2015</a:t>
             </a:fld>
             <a:endParaRPr lang="de-AT"/>
           </a:p>
@@ -6755,7 +6753,7 @@
           <a:p>
             <a:fld id="{3ECD1B6F-0B74-438A-A710-326310E0C2AE}" type="datetimeFigureOut">
               <a:rPr lang="de-AT" smtClean="0"/>
-              <a:t>15.10.2015</a:t>
+              <a:t>21.10.2015</a:t>
             </a:fld>
             <a:endParaRPr lang="de-AT"/>
           </a:p>
@@ -6965,7 +6963,7 @@
           <a:p>
             <a:fld id="{3ECD1B6F-0B74-438A-A710-326310E0C2AE}" type="datetimeFigureOut">
               <a:rPr lang="de-AT" smtClean="0"/>
-              <a:t>15.10.2015</a:t>
+              <a:t>21.10.2015</a:t>
             </a:fld>
             <a:endParaRPr lang="de-AT"/>
           </a:p>
@@ -7303,7 +7301,7 @@
           <a:p>
             <a:fld id="{3ECD1B6F-0B74-438A-A710-326310E0C2AE}" type="datetimeFigureOut">
               <a:rPr lang="de-AT" smtClean="0"/>
-              <a:t>15.10.2015</a:t>
+              <a:t>21.10.2015</a:t>
             </a:fld>
             <a:endParaRPr lang="de-AT"/>
           </a:p>
@@ -19944,11 +19942,7 @@
           <a:p>
             <a:r>
               <a:rPr lang="de-AT" sz="3200" dirty="0" smtClean="0"/>
-              <a:t>Setzt </a:t>
-            </a:r>
-            <a:r>
-              <a:rPr lang="de-AT" sz="3200" dirty="0" smtClean="0"/>
-              <a:t>abhängig von Ausdrücken css klassen</a:t>
+              <a:t>Setzt abhängig von Ausdrücken css klassen</a:t>
             </a:r>
           </a:p>
           <a:p>
@@ -23309,11 +23303,7 @@
             <a:pPr lvl="1"/>
             <a:r>
               <a:rPr lang="de-AT" dirty="0" smtClean="0"/>
-              <a:t>Letztes </a:t>
-            </a:r>
-            <a:r>
-              <a:rPr lang="de-AT" dirty="0" smtClean="0"/>
-              <a:t>Element = Factory Funktion</a:t>
+              <a:t>Letztes Element = Factory Funktion</a:t>
             </a:r>
             <a:endParaRPr lang="de-AT" dirty="0"/>
           </a:p>
@@ -24360,13 +24350,8 @@
           <a:p>
             <a:r>
               <a:rPr lang="de-AT" dirty="0" smtClean="0"/>
-              <a:t>values können durch einen decorator verändert </a:t>
-            </a:r>
-            <a:r>
-              <a:rPr lang="de-AT" dirty="0" smtClean="0"/>
-              <a:t>werden</a:t>
-            </a:r>
-            <a:endParaRPr lang="de-AT" dirty="0" smtClean="0"/>
+              <a:t>values können durch einen decorator verändert werden</a:t>
+            </a:r>
           </a:p>
         </p:txBody>
       </p:sp>
@@ -26455,11 +26440,7 @@
           <a:p>
             <a:r>
               <a:rPr lang="de-AT" dirty="0" smtClean="0"/>
-              <a:t>Komplettes </a:t>
-            </a:r>
-            <a:r>
-              <a:rPr lang="de-AT" dirty="0" smtClean="0"/>
-              <a:t>Sample: 015 httpall</a:t>
+              <a:t>Komplettes Sample: 015 httpall</a:t>
             </a:r>
             <a:endParaRPr lang="de-AT" dirty="0"/>
           </a:p>
@@ -30979,7 +30960,7 @@
       </p:grpSpPr>
       <p:sp>
         <p:nvSpPr>
-          <p:cNvPr id="2" name="Title 1"/>
+          <p:cNvPr id="3" name="Title 2"/>
           <p:cNvSpPr>
             <a:spLocks noGrp="1"/>
           </p:cNvSpPr>
@@ -30994,7 +30975,7 @@
           <a:p>
             <a:r>
               <a:rPr lang="en-US" dirty="0" smtClean="0"/>
-              <a:t>filters</a:t>
+              <a:t>Filter</a:t>
             </a:r>
             <a:endParaRPr lang="de-AT" dirty="0"/>
           </a:p>
@@ -31002,7 +30983,7 @@
       </p:sp>
       <p:sp>
         <p:nvSpPr>
-          <p:cNvPr id="3" name="Content Placeholder 2"/>
+          <p:cNvPr id="4" name="Content Placeholder 3"/>
           <p:cNvSpPr>
             <a:spLocks noGrp="1"/>
           </p:cNvSpPr>
@@ -31015,13 +30996,125 @@
           <a:bodyPr/>
           <a:lstStyle/>
           <a:p>
-            <a:endParaRPr lang="de-AT"/>
-          </a:p>
-        </p:txBody>
-      </p:sp>
-      <p:sp>
-        <p:nvSpPr>
-          <p:cNvPr id="4" name="Text Placeholder 3"/>
+            <a:r>
+              <a:rPr lang="en-US" dirty="0" smtClean="0"/>
+              <a:t>In {{ }} </a:t>
+            </a:r>
+            <a:r>
+              <a:rPr lang="en-US" dirty="0" err="1" smtClean="0"/>
+              <a:t>Ausdrücken</a:t>
+            </a:r>
+            <a:r>
+              <a:rPr lang="en-US" dirty="0" smtClean="0"/>
+              <a:t> </a:t>
+            </a:r>
+            <a:r>
+              <a:rPr lang="en-US" dirty="0" err="1" smtClean="0"/>
+              <a:t>können</a:t>
+            </a:r>
+            <a:r>
+              <a:rPr lang="en-US" dirty="0" smtClean="0"/>
+              <a:t> Filter </a:t>
+            </a:r>
+            <a:r>
+              <a:rPr lang="en-US" dirty="0" err="1" smtClean="0"/>
+              <a:t>werte</a:t>
+            </a:r>
+            <a:r>
+              <a:rPr lang="en-US" dirty="0" smtClean="0"/>
+              <a:t> “</a:t>
+            </a:r>
+            <a:r>
+              <a:rPr lang="en-US" dirty="0" err="1" smtClean="0"/>
+              <a:t>manipulieren</a:t>
+            </a:r>
+            <a:r>
+              <a:rPr lang="en-US" dirty="0" smtClean="0"/>
+              <a:t>”</a:t>
+            </a:r>
+          </a:p>
+          <a:p>
+            <a:r>
+              <a:rPr lang="en-US" dirty="0" err="1" smtClean="0"/>
+              <a:t>Z.b</a:t>
+            </a:r>
+            <a:r>
+              <a:rPr lang="en-US" dirty="0" smtClean="0"/>
+              <a:t>. number </a:t>
+            </a:r>
+            <a:r>
+              <a:rPr lang="en-US" dirty="0" err="1" smtClean="0"/>
+              <a:t>zum</a:t>
+            </a:r>
+            <a:r>
+              <a:rPr lang="en-US" dirty="0" smtClean="0"/>
+              <a:t> </a:t>
+            </a:r>
+            <a:r>
+              <a:rPr lang="en-US" dirty="0" err="1" smtClean="0"/>
+              <a:t>formatieren</a:t>
+            </a:r>
+            <a:r>
+              <a:rPr lang="en-US" dirty="0" smtClean="0"/>
+              <a:t> von </a:t>
+            </a:r>
+            <a:r>
+              <a:rPr lang="en-US" dirty="0" err="1" smtClean="0"/>
+              <a:t>Zahlen</a:t>
+            </a:r>
+            <a:endParaRPr lang="en-US" dirty="0" smtClean="0"/>
+          </a:p>
+          <a:p>
+            <a:r>
+              <a:rPr lang="en-US" dirty="0" err="1" smtClean="0"/>
+              <a:t>Eigene</a:t>
+            </a:r>
+            <a:r>
+              <a:rPr lang="en-US" dirty="0" smtClean="0"/>
+              <a:t> filter </a:t>
+            </a:r>
+            <a:r>
+              <a:rPr lang="en-US" dirty="0" err="1" smtClean="0"/>
+              <a:t>können</a:t>
+            </a:r>
+            <a:r>
+              <a:rPr lang="en-US" dirty="0" smtClean="0"/>
+              <a:t> </a:t>
+            </a:r>
+            <a:r>
+              <a:rPr lang="en-US" dirty="0" err="1" smtClean="0"/>
+              <a:t>über</a:t>
+            </a:r>
+            <a:r>
+              <a:rPr lang="en-US" dirty="0" smtClean="0"/>
+              <a:t> </a:t>
+            </a:r>
+            <a:r>
+              <a:rPr lang="en-US" dirty="0" smtClean="0">
+                <a:latin typeface="Courier New" panose="02070309020205020404" pitchFamily="49" charset="0"/>
+                <a:cs typeface="Courier New" panose="02070309020205020404" pitchFamily="49" charset="0"/>
+              </a:rPr>
+              <a:t>.filter </a:t>
+            </a:r>
+            <a:r>
+              <a:rPr lang="en-US" dirty="0" err="1" smtClean="0"/>
+              <a:t>definiert</a:t>
+            </a:r>
+            <a:r>
+              <a:rPr lang="en-US" dirty="0" smtClean="0"/>
+              <a:t> </a:t>
+            </a:r>
+            <a:r>
+              <a:rPr lang="en-US" dirty="0" err="1" smtClean="0"/>
+              <a:t>werden</a:t>
+            </a:r>
+            <a:endParaRPr lang="de-AT" dirty="0"/>
+          </a:p>
+        </p:txBody>
+      </p:sp>
+      <p:sp>
+        <p:nvSpPr>
+          <p:cNvPr id="5" name="Text Placeholder 4"/>
           <p:cNvSpPr>
             <a:spLocks noGrp="1"/>
           </p:cNvSpPr>
@@ -31041,7 +31134,7 @@
     </p:spTree>
     <p:extLst>
       <p:ext uri="{BB962C8B-B14F-4D97-AF65-F5344CB8AC3E}">
-        <p14:creationId xmlns:p14="http://schemas.microsoft.com/office/powerpoint/2010/main" val="815414984"/>
+        <p14:creationId xmlns:p14="http://schemas.microsoft.com/office/powerpoint/2010/main" val="2738516323"/>
       </p:ext>
     </p:extLst>
   </p:cSld>
@@ -32924,212 +33017,6 @@
 </file>
 
 <file path=ppt/slides/slide81.xml><?xml version="1.0" encoding="utf-8"?>
-<p:sld xmlns:a="http://schemas.openxmlformats.org/drawingml/2006/main" xmlns:r="http://schemas.openxmlformats.org/officeDocument/2006/relationships" xmlns:p="http://schemas.openxmlformats.org/presentationml/2006/main">
-  <p:cSld>
-    <p:spTree>
-      <p:nvGrpSpPr>
-        <p:cNvPr id="1" name=""/>
-        <p:cNvGrpSpPr/>
-        <p:nvPr/>
-      </p:nvGrpSpPr>
-      <p:grpSpPr>
-        <a:xfrm>
-          <a:off x="0" y="0"/>
-          <a:ext cx="0" cy="0"/>
-          <a:chOff x="0" y="0"/>
-          <a:chExt cx="0" cy="0"/>
-        </a:xfrm>
-      </p:grpSpPr>
-      <p:sp>
-        <p:nvSpPr>
-          <p:cNvPr id="3" name="Title 2"/>
-          <p:cNvSpPr>
-            <a:spLocks noGrp="1"/>
-          </p:cNvSpPr>
-          <p:nvPr>
-            <p:ph type="title"/>
-          </p:nvPr>
-        </p:nvSpPr>
-        <p:spPr/>
-        <p:txBody>
-          <a:bodyPr/>
-          <a:lstStyle/>
-          <a:p>
-            <a:r>
-              <a:rPr lang="en-US" dirty="0" smtClean="0"/>
-              <a:t>Filter</a:t>
-            </a:r>
-            <a:endParaRPr lang="de-AT" dirty="0"/>
-          </a:p>
-        </p:txBody>
-      </p:sp>
-      <p:sp>
-        <p:nvSpPr>
-          <p:cNvPr id="4" name="Content Placeholder 3"/>
-          <p:cNvSpPr>
-            <a:spLocks noGrp="1"/>
-          </p:cNvSpPr>
-          <p:nvPr>
-            <p:ph sz="quarter" idx="12"/>
-          </p:nvPr>
-        </p:nvSpPr>
-        <p:spPr/>
-        <p:txBody>
-          <a:bodyPr/>
-          <a:lstStyle/>
-          <a:p>
-            <a:r>
-              <a:rPr lang="en-US" dirty="0" smtClean="0"/>
-              <a:t>In {{ }} </a:t>
-            </a:r>
-            <a:r>
-              <a:rPr lang="en-US" dirty="0" err="1" smtClean="0"/>
-              <a:t>Ausdrücken</a:t>
-            </a:r>
-            <a:r>
-              <a:rPr lang="en-US" dirty="0" smtClean="0"/>
-              <a:t> </a:t>
-            </a:r>
-            <a:r>
-              <a:rPr lang="en-US" dirty="0" err="1" smtClean="0"/>
-              <a:t>können</a:t>
-            </a:r>
-            <a:r>
-              <a:rPr lang="en-US" dirty="0" smtClean="0"/>
-              <a:t> Filter </a:t>
-            </a:r>
-            <a:r>
-              <a:rPr lang="en-US" dirty="0" err="1" smtClean="0"/>
-              <a:t>werte</a:t>
-            </a:r>
-            <a:r>
-              <a:rPr lang="en-US" dirty="0" smtClean="0"/>
-              <a:t> “</a:t>
-            </a:r>
-            <a:r>
-              <a:rPr lang="en-US" dirty="0" err="1" smtClean="0"/>
-              <a:t>manipulieren</a:t>
-            </a:r>
-            <a:r>
-              <a:rPr lang="en-US" dirty="0" smtClean="0"/>
-              <a:t>”</a:t>
-            </a:r>
-          </a:p>
-          <a:p>
-            <a:r>
-              <a:rPr lang="en-US" dirty="0" err="1" smtClean="0"/>
-              <a:t>Z.b</a:t>
-            </a:r>
-            <a:r>
-              <a:rPr lang="en-US" dirty="0" smtClean="0"/>
-              <a:t>. number </a:t>
-            </a:r>
-            <a:r>
-              <a:rPr lang="en-US" dirty="0" err="1" smtClean="0"/>
-              <a:t>zum</a:t>
-            </a:r>
-            <a:r>
-              <a:rPr lang="en-US" dirty="0" smtClean="0"/>
-              <a:t> </a:t>
-            </a:r>
-            <a:r>
-              <a:rPr lang="en-US" dirty="0" err="1" smtClean="0"/>
-              <a:t>formatieren</a:t>
-            </a:r>
-            <a:r>
-              <a:rPr lang="en-US" dirty="0" smtClean="0"/>
-              <a:t> von </a:t>
-            </a:r>
-            <a:r>
-              <a:rPr lang="en-US" dirty="0" err="1" smtClean="0"/>
-              <a:t>Zahlen</a:t>
-            </a:r>
-            <a:endParaRPr lang="en-US" dirty="0" smtClean="0"/>
-          </a:p>
-          <a:p>
-            <a:r>
-              <a:rPr lang="en-US" dirty="0" err="1" smtClean="0"/>
-              <a:t>Eigene</a:t>
-            </a:r>
-            <a:r>
-              <a:rPr lang="en-US" dirty="0" smtClean="0"/>
-              <a:t> filter </a:t>
-            </a:r>
-            <a:r>
-              <a:rPr lang="en-US" dirty="0" err="1" smtClean="0"/>
-              <a:t>können</a:t>
-            </a:r>
-            <a:r>
-              <a:rPr lang="en-US" dirty="0" smtClean="0"/>
-              <a:t> </a:t>
-            </a:r>
-            <a:r>
-              <a:rPr lang="en-US" dirty="0" err="1" smtClean="0"/>
-              <a:t>über</a:t>
-            </a:r>
-            <a:r>
-              <a:rPr lang="en-US" dirty="0" smtClean="0"/>
-              <a:t> .filter </a:t>
-            </a:r>
-            <a:r>
-              <a:rPr lang="en-US" dirty="0" err="1" smtClean="0"/>
-              <a:t>definiert</a:t>
-            </a:r>
-            <a:r>
-              <a:rPr lang="en-US" dirty="0" smtClean="0"/>
-              <a:t> </a:t>
-            </a:r>
-            <a:r>
-              <a:rPr lang="en-US" dirty="0" err="1" smtClean="0"/>
-              <a:t>werden</a:t>
-            </a:r>
-            <a:endParaRPr lang="de-AT" dirty="0"/>
-          </a:p>
-        </p:txBody>
-      </p:sp>
-      <p:sp>
-        <p:nvSpPr>
-          <p:cNvPr id="5" name="Text Placeholder 4"/>
-          <p:cNvSpPr>
-            <a:spLocks noGrp="1"/>
-          </p:cNvSpPr>
-          <p:nvPr>
-            <p:ph type="body" sz="quarter" idx="23"/>
-          </p:nvPr>
-        </p:nvSpPr>
-        <p:spPr/>
-        <p:txBody>
-          <a:bodyPr/>
-          <a:lstStyle/>
-          <a:p>
-            <a:endParaRPr lang="de-AT"/>
-          </a:p>
-        </p:txBody>
-      </p:sp>
-    </p:spTree>
-    <p:extLst>
-      <p:ext uri="{BB962C8B-B14F-4D97-AF65-F5344CB8AC3E}">
-        <p14:creationId xmlns:p14="http://schemas.microsoft.com/office/powerpoint/2010/main" val="2738516323"/>
-      </p:ext>
-    </p:extLst>
-  </p:cSld>
-  <p:clrMapOvr>
-    <a:masterClrMapping/>
-  </p:clrMapOvr>
-  <p:transition spd="slow">
-    <p:push/>
-  </p:transition>
-  <p:timing>
-    <p:tnLst>
-      <p:par>
-        <p:cTn id="1" dur="indefinite" restart="never" nodeType="tmRoot"/>
-      </p:par>
-    </p:tnLst>
-  </p:timing>
-</p:sld>
-</file>
-
-<file path=ppt/slides/slide82.xml><?xml version="1.0" encoding="utf-8"?>
 <p:sld xmlns:a="http://schemas.openxmlformats.org/drawingml/2006/main" xmlns:r="http://schemas.openxmlformats.org/officeDocument/2006/relationships" xmlns:p="http://schemas.openxmlformats.org/presentationml/2006/main">
   <p:cSld>
     <p:spTree>

</xml_diff>

<commit_message>
sample for $q service
</commit_message>
<xml_diff>
--- a/slides/AngularJS.pptx
+++ b/slides/AngularJS.pptx
@@ -5,7 +5,7 @@
     <p:sldMasterId id="2147483660" r:id="rId1"/>
   </p:sldMasterIdLst>
   <p:notesMasterIdLst>
-    <p:notesMasterId r:id="rId91"/>
+    <p:notesMasterId r:id="rId92"/>
   </p:notesMasterIdLst>
   <p:sldIdLst>
     <p:sldId id="256" r:id="rId2"/>
@@ -95,8 +95,9 @@
     <p:sldId id="344" r:id="rId86"/>
     <p:sldId id="345" r:id="rId87"/>
     <p:sldId id="346" r:id="rId88"/>
-    <p:sldId id="347" r:id="rId89"/>
-    <p:sldId id="348" r:id="rId90"/>
+    <p:sldId id="349" r:id="rId89"/>
+    <p:sldId id="347" r:id="rId90"/>
+    <p:sldId id="348" r:id="rId91"/>
   </p:sldIdLst>
   <p:sldSz cx="12192000" cy="6858000"/>
   <p:notesSz cx="6858000" cy="9144000"/>
@@ -323,6 +324,7 @@
             <p14:sldId id="344"/>
             <p14:sldId id="345"/>
             <p14:sldId id="346"/>
+            <p14:sldId id="349"/>
           </p14:sldIdLst>
         </p14:section>
         <p14:section name="Transclusion" id="{6C8C010E-F998-4F69-ACD1-94743B2B9B8A}">
@@ -422,7 +424,7 @@
           <a:p>
             <a:fld id="{4837C6CC-C2FC-4BED-8348-2E96B1BEB824}" type="datetimeFigureOut">
               <a:rPr lang="de-AT" smtClean="0"/>
-              <a:t>29.03.2016</a:t>
+              <a:t>06.06.2016</a:t>
             </a:fld>
             <a:endParaRPr lang="de-AT"/>
           </a:p>
@@ -581,7 +583,7 @@
           <a:p>
             <a:fld id="{3ED8300C-D1FA-477F-A2B8-EC6998E43AEE}" type="slidenum">
               <a:rPr lang="de-AT" smtClean="0"/>
-              <a:t>‹#›</a:t>
+              <a:t>‹Nr.›</a:t>
             </a:fld>
             <a:endParaRPr lang="de-AT"/>
           </a:p>
@@ -6777,7 +6779,7 @@
           <a:p>
             <a:fld id="{3ECD1B6F-0B74-438A-A710-326310E0C2AE}" type="datetimeFigureOut">
               <a:rPr lang="de-AT" smtClean="0"/>
-              <a:t>29.03.2016</a:t>
+              <a:t>06.06.2016</a:t>
             </a:fld>
             <a:endParaRPr lang="de-AT"/>
           </a:p>
@@ -6835,7 +6837,7 @@
           <a:p>
             <a:fld id="{3DD3D01F-5FDD-41FB-97F7-A0C5433A3280}" type="slidenum">
               <a:rPr lang="de-AT" smtClean="0"/>
-              <a:t>‹#›</a:t>
+              <a:t>‹Nr.›</a:t>
             </a:fld>
             <a:endParaRPr lang="de-AT"/>
           </a:p>
@@ -6987,7 +6989,7 @@
           <a:p>
             <a:fld id="{3ECD1B6F-0B74-438A-A710-326310E0C2AE}" type="datetimeFigureOut">
               <a:rPr lang="de-AT" smtClean="0"/>
-              <a:t>29.03.2016</a:t>
+              <a:t>06.06.2016</a:t>
             </a:fld>
             <a:endParaRPr lang="de-AT"/>
           </a:p>
@@ -7045,7 +7047,7 @@
           <a:p>
             <a:fld id="{3DD3D01F-5FDD-41FB-97F7-A0C5433A3280}" type="slidenum">
               <a:rPr lang="de-AT" smtClean="0"/>
-              <a:t>‹#›</a:t>
+              <a:t>‹Nr.›</a:t>
             </a:fld>
             <a:endParaRPr lang="de-AT"/>
           </a:p>
@@ -7325,7 +7327,7 @@
           <a:p>
             <a:fld id="{3ECD1B6F-0B74-438A-A710-326310E0C2AE}" type="datetimeFigureOut">
               <a:rPr lang="de-AT" smtClean="0"/>
-              <a:t>29.03.2016</a:t>
+              <a:t>06.06.2016</a:t>
             </a:fld>
             <a:endParaRPr lang="de-AT"/>
           </a:p>
@@ -7383,7 +7385,7 @@
           <a:p>
             <a:fld id="{3DD3D01F-5FDD-41FB-97F7-A0C5433A3280}" type="slidenum">
               <a:rPr lang="de-AT" smtClean="0"/>
-              <a:t>‹#›</a:t>
+              <a:t>‹Nr.›</a:t>
             </a:fld>
             <a:endParaRPr lang="de-AT"/>
           </a:p>
@@ -33822,7 +33824,63 @@
             </a:r>
             <a:r>
               <a:rPr lang="en-US" dirty="0" smtClean="0"/>
-              <a:t> Syntax</a:t>
+              <a:t> </a:t>
+            </a:r>
+            <a:r>
+              <a:rPr lang="en-US" dirty="0" smtClean="0"/>
+              <a:t>Syntax</a:t>
+            </a:r>
+          </a:p>
+          <a:p>
+            <a:r>
+              <a:rPr lang="en-US" dirty="0" err="1" smtClean="0"/>
+              <a:t>Strikter</a:t>
+            </a:r>
+            <a:r>
+              <a:rPr lang="en-US" dirty="0" smtClean="0"/>
+              <a:t> </a:t>
+            </a:r>
+            <a:r>
+              <a:rPr lang="en-US" dirty="0" err="1" smtClean="0"/>
+              <a:t>als</a:t>
+            </a:r>
+            <a:r>
+              <a:rPr lang="en-US" dirty="0" smtClean="0"/>
+              <a:t> </a:t>
+            </a:r>
+            <a:r>
+              <a:rPr lang="en-US" dirty="0" err="1" smtClean="0"/>
+              <a:t>Direktiven</a:t>
+            </a:r>
+            <a:endParaRPr lang="en-US" dirty="0"/>
+          </a:p>
+          <a:p>
+            <a:pPr lvl="1"/>
+            <a:r>
+              <a:rPr lang="en-US" dirty="0" err="1" smtClean="0"/>
+              <a:t>Keine</a:t>
+            </a:r>
+            <a:r>
+              <a:rPr lang="en-US" dirty="0" smtClean="0"/>
+              <a:t> </a:t>
+            </a:r>
+            <a:r>
+              <a:rPr lang="en-US" dirty="0" err="1" smtClean="0"/>
+              <a:t>direkte</a:t>
+            </a:r>
+            <a:r>
+              <a:rPr lang="en-US" dirty="0" smtClean="0"/>
+              <a:t> DOM Manipulation</a:t>
+            </a:r>
+          </a:p>
+          <a:p>
+            <a:r>
+              <a:rPr lang="en-US" dirty="0" err="1" smtClean="0"/>
+              <a:t>Mehr</a:t>
+            </a:r>
+            <a:r>
+              <a:rPr lang="en-US" dirty="0" smtClean="0"/>
+              <a:t> Lifecycle Hooks</a:t>
             </a:r>
           </a:p>
           <a:p>
@@ -35227,7 +35285,7 @@
       </p:grpSpPr>
       <p:sp>
         <p:nvSpPr>
-          <p:cNvPr id="2" name="Title 1"/>
+          <p:cNvPr id="2" name="Titel 1"/>
           <p:cNvSpPr>
             <a:spLocks noGrp="1"/>
           </p:cNvSpPr>
@@ -35241,8 +35299,8 @@
           <a:lstStyle/>
           <a:p>
             <a:r>
-              <a:rPr lang="en-US" dirty="0" err="1" smtClean="0"/>
-              <a:t>Transclusion</a:t>
+              <a:rPr lang="de-AT" dirty="0" smtClean="0"/>
+              <a:t>Components - Conclusio</a:t>
             </a:r>
             <a:endParaRPr lang="de-AT" dirty="0"/>
           </a:p>
@@ -35250,7 +35308,7 @@
       </p:sp>
       <p:sp>
         <p:nvSpPr>
-          <p:cNvPr id="3" name="Content Placeholder 2"/>
+          <p:cNvPr id="3" name="Inhaltsplatzhalter 2"/>
           <p:cNvSpPr>
             <a:spLocks noGrp="1"/>
           </p:cNvSpPr>
@@ -35264,158 +35322,28 @@
           <a:lstStyle/>
           <a:p>
             <a:r>
-              <a:rPr lang="en-US" dirty="0" err="1" smtClean="0"/>
-              <a:t>Direktiven</a:t>
-            </a:r>
-            <a:r>
-              <a:rPr lang="en-US" dirty="0" smtClean="0"/>
-              <a:t>, die </a:t>
-            </a:r>
-            <a:r>
-              <a:rPr lang="en-US" dirty="0" err="1" smtClean="0"/>
-              <a:t>Inhalte</a:t>
-            </a:r>
-            <a:r>
-              <a:rPr lang="en-US" dirty="0" smtClean="0"/>
-              <a:t> </a:t>
-            </a:r>
-            <a:r>
-              <a:rPr lang="en-US" dirty="0" err="1" smtClean="0"/>
-              <a:t>wrappen</a:t>
-            </a:r>
-            <a:endParaRPr lang="en-US" dirty="0" smtClean="0"/>
-          </a:p>
-          <a:p>
-            <a:r>
-              <a:rPr lang="en-US" dirty="0" err="1" smtClean="0"/>
-              <a:t>Beispiel</a:t>
-            </a:r>
-            <a:r>
-              <a:rPr lang="en-US" dirty="0" smtClean="0"/>
-              <a:t>: </a:t>
-            </a:r>
-            <a:r>
-              <a:rPr lang="en-US" dirty="0" err="1" smtClean="0"/>
-              <a:t>Modaler</a:t>
-            </a:r>
-            <a:r>
-              <a:rPr lang="en-US" dirty="0" smtClean="0"/>
-              <a:t> Dialog</a:t>
-            </a:r>
-          </a:p>
-          <a:p>
-            <a:pPr lvl="1"/>
-            <a:r>
-              <a:rPr lang="en-US" dirty="0" err="1" smtClean="0"/>
-              <a:t>Umrandung</a:t>
-            </a:r>
-            <a:r>
-              <a:rPr lang="en-US" dirty="0" smtClean="0"/>
-              <a:t>, </a:t>
-            </a:r>
-            <a:r>
-              <a:rPr lang="en-US" dirty="0" err="1" smtClean="0"/>
-              <a:t>Schließenbutton</a:t>
-            </a:r>
-            <a:r>
-              <a:rPr lang="en-US" dirty="0" smtClean="0"/>
-              <a:t>, </a:t>
-            </a:r>
-            <a:r>
-              <a:rPr lang="en-US" dirty="0" err="1" smtClean="0"/>
-              <a:t>titlebar</a:t>
-            </a:r>
-            <a:r>
-              <a:rPr lang="en-US" dirty="0" smtClean="0"/>
-              <a:t> </a:t>
-            </a:r>
-            <a:r>
-              <a:rPr lang="en-US" dirty="0" err="1" smtClean="0"/>
-              <a:t>etc</a:t>
-            </a:r>
-            <a:r>
-              <a:rPr lang="en-US" dirty="0" smtClean="0"/>
-              <a:t>, </a:t>
-            </a:r>
-            <a:r>
-              <a:rPr lang="en-US" dirty="0" err="1" smtClean="0"/>
-              <a:t>haben</a:t>
-            </a:r>
-            <a:r>
-              <a:rPr lang="en-US" dirty="0" smtClean="0"/>
-              <a:t> </a:t>
-            </a:r>
-            <a:r>
-              <a:rPr lang="en-US" dirty="0" err="1" smtClean="0"/>
-              <a:t>gleiche</a:t>
-            </a:r>
-            <a:r>
-              <a:rPr lang="en-US" dirty="0" smtClean="0"/>
-              <a:t> </a:t>
-            </a:r>
-            <a:r>
-              <a:rPr lang="en-US" dirty="0" err="1" smtClean="0"/>
-              <a:t>Struktur</a:t>
-            </a:r>
-            <a:endParaRPr lang="en-US" dirty="0" smtClean="0"/>
-          </a:p>
-          <a:p>
-            <a:pPr lvl="1"/>
-            <a:r>
-              <a:rPr lang="en-US" dirty="0" err="1" smtClean="0"/>
-              <a:t>Inhalt</a:t>
-            </a:r>
-            <a:r>
-              <a:rPr lang="en-US" dirty="0" smtClean="0"/>
-              <a:t>: </a:t>
-            </a:r>
-            <a:r>
-              <a:rPr lang="en-US" dirty="0" err="1" smtClean="0"/>
-              <a:t>Dynamisch</a:t>
-            </a:r>
-            <a:r>
-              <a:rPr lang="en-US" dirty="0" smtClean="0"/>
-              <a:t>, </a:t>
-            </a:r>
-            <a:r>
-              <a:rPr lang="en-US" dirty="0" err="1" smtClean="0"/>
-              <a:t>bestimmt</a:t>
-            </a:r>
-            <a:r>
-              <a:rPr lang="en-US" dirty="0" smtClean="0"/>
-              <a:t> </a:t>
-            </a:r>
-            <a:r>
-              <a:rPr lang="en-US" dirty="0" err="1" smtClean="0"/>
-              <a:t>durch</a:t>
-            </a:r>
-            <a:r>
-              <a:rPr lang="en-US" dirty="0" smtClean="0"/>
-              <a:t> </a:t>
-            </a:r>
-            <a:r>
-              <a:rPr lang="en-US" dirty="0" err="1" smtClean="0"/>
-              <a:t>Anwendung</a:t>
-            </a:r>
-            <a:r>
-              <a:rPr lang="en-US" dirty="0" smtClean="0"/>
-              <a:t> der </a:t>
-            </a:r>
-            <a:r>
-              <a:rPr lang="en-US" dirty="0" err="1" smtClean="0"/>
-              <a:t>Direktive</a:t>
-            </a:r>
-            <a:endParaRPr lang="de-AT" dirty="0" smtClean="0"/>
-          </a:p>
-          <a:p>
-            <a:pPr lvl="1"/>
-            <a:endParaRPr lang="en-US" dirty="0" smtClean="0"/>
-          </a:p>
-        </p:txBody>
-      </p:sp>
-      <p:sp>
-        <p:nvSpPr>
-          <p:cNvPr id="4" name="Text Placeholder 3"/>
+              <a:rPr lang="de-AT" dirty="0" smtClean="0"/>
+              <a:t>Eine Applikation besteht aus einem Baum von Komponenten</a:t>
+            </a:r>
+          </a:p>
+          <a:p>
+            <a:r>
+              <a:rPr lang="de-AT" dirty="0" smtClean="0"/>
+              <a:t>Bessere Strukturierung der Applikation</a:t>
+            </a:r>
+          </a:p>
+          <a:p>
+            <a:r>
+              <a:rPr lang="de-AT" dirty="0" smtClean="0"/>
+              <a:t>Expliziter als Controller + Template</a:t>
+            </a:r>
+            <a:endParaRPr lang="de-AT" dirty="0"/>
+          </a:p>
+        </p:txBody>
+      </p:sp>
+      <p:sp>
+        <p:nvSpPr>
+          <p:cNvPr id="4" name="Textplatzhalter 3"/>
           <p:cNvSpPr>
             <a:spLocks noGrp="1"/>
           </p:cNvSpPr>
@@ -35435,7 +35363,7 @@
     </p:spTree>
     <p:extLst>
       <p:ext uri="{BB962C8B-B14F-4D97-AF65-F5344CB8AC3E}">
-        <p14:creationId xmlns:p14="http://schemas.microsoft.com/office/powerpoint/2010/main" val="3939587667"/>
+        <p14:creationId xmlns:p14="http://schemas.microsoft.com/office/powerpoint/2010/main" val="2707164960"/>
       </p:ext>
     </p:extLst>
   </p:cSld>
@@ -35445,13 +35373,6 @@
   <p:transition spd="slow">
     <p:push/>
   </p:transition>
-  <p:timing>
-    <p:tnLst>
-      <p:par>
-        <p:cTn id="1" dur="indefinite" restart="never" nodeType="tmRoot"/>
-      </p:par>
-    </p:tnLst>
-  </p:timing>
 </p:sld>
 </file>
 
@@ -35491,10 +35412,6 @@
               <a:rPr lang="en-US" dirty="0" err="1" smtClean="0"/>
               <a:t>Transclusion</a:t>
             </a:r>
-            <a:r>
-              <a:rPr lang="en-US" dirty="0" smtClean="0"/>
-              <a:t> Slots</a:t>
-            </a:r>
             <a:endParaRPr lang="de-AT" dirty="0"/>
           </a:p>
         </p:txBody>
@@ -35516,7 +35433,15 @@
           <a:p>
             <a:r>
               <a:rPr lang="en-US" dirty="0" err="1" smtClean="0"/>
-              <a:t>Mehrere</a:t>
+              <a:t>Direktiven</a:t>
+            </a:r>
+            <a:r>
+              <a:rPr lang="en-US" dirty="0" smtClean="0"/>
+              <a:t>, die </a:t>
+            </a:r>
+            <a:r>
+              <a:rPr lang="en-US" dirty="0" err="1" smtClean="0"/>
+              <a:t>Inhalte</a:t>
             </a:r>
             <a:r>
               <a:rPr lang="en-US" dirty="0" smtClean="0"/>
@@ -35524,34 +35449,135 @@
             </a:r>
             <a:r>
               <a:rPr lang="en-US" dirty="0" err="1" smtClean="0"/>
-              <a:t>Transclusions</a:t>
+              <a:t>wrappen</a:t>
+            </a:r>
+            <a:endParaRPr lang="en-US" dirty="0" smtClean="0"/>
+          </a:p>
+          <a:p>
+            <a:r>
+              <a:rPr lang="en-US" dirty="0" err="1" smtClean="0"/>
+              <a:t>Beispiel</a:t>
             </a:r>
             <a:r>
               <a:rPr lang="en-US" dirty="0" smtClean="0"/>
-              <a:t> pro directive</a:t>
+              <a:t>: </a:t>
+            </a:r>
+            <a:r>
+              <a:rPr lang="en-US" dirty="0" err="1" smtClean="0"/>
+              <a:t>Modaler</a:t>
+            </a:r>
+            <a:r>
+              <a:rPr lang="en-US" dirty="0" smtClean="0"/>
+              <a:t> Dialog</a:t>
             </a:r>
           </a:p>
           <a:p>
             <a:pPr lvl="1"/>
             <a:r>
+              <a:rPr lang="en-US" dirty="0" err="1" smtClean="0"/>
+              <a:t>Umrandung</a:t>
+            </a:r>
+            <a:r>
               <a:rPr lang="en-US" dirty="0" smtClean="0"/>
-              <a:t>E.g. Title content, Body content</a:t>
-            </a:r>
-          </a:p>
-          <a:p>
+              <a:t>, </a:t>
+            </a:r>
             <a:r>
               <a:rPr lang="en-US" dirty="0" err="1" smtClean="0"/>
-              <a:t>Durch</a:t>
+              <a:t>Schließenbutton</a:t>
             </a:r>
             <a:r>
               <a:rPr lang="en-US" dirty="0" smtClean="0"/>
-              <a:t> Name </a:t>
+              <a:t>, </a:t>
             </a:r>
             <a:r>
               <a:rPr lang="en-US" dirty="0" err="1" smtClean="0"/>
-              <a:t>identifiziert</a:t>
-            </a:r>
-            <a:endParaRPr lang="de-AT" dirty="0"/>
+              <a:t>titlebar</a:t>
+            </a:r>
+            <a:r>
+              <a:rPr lang="en-US" dirty="0" smtClean="0"/>
+              <a:t> </a:t>
+            </a:r>
+            <a:r>
+              <a:rPr lang="en-US" dirty="0" err="1" smtClean="0"/>
+              <a:t>etc</a:t>
+            </a:r>
+            <a:r>
+              <a:rPr lang="en-US" dirty="0" smtClean="0"/>
+              <a:t>, </a:t>
+            </a:r>
+            <a:r>
+              <a:rPr lang="en-US" dirty="0" err="1" smtClean="0"/>
+              <a:t>haben</a:t>
+            </a:r>
+            <a:r>
+              <a:rPr lang="en-US" dirty="0" smtClean="0"/>
+              <a:t> </a:t>
+            </a:r>
+            <a:r>
+              <a:rPr lang="en-US" dirty="0" err="1" smtClean="0"/>
+              <a:t>gleiche</a:t>
+            </a:r>
+            <a:r>
+              <a:rPr lang="en-US" dirty="0" smtClean="0"/>
+              <a:t> </a:t>
+            </a:r>
+            <a:r>
+              <a:rPr lang="en-US" dirty="0" err="1" smtClean="0"/>
+              <a:t>Struktur</a:t>
+            </a:r>
+            <a:endParaRPr lang="en-US" dirty="0" smtClean="0"/>
+          </a:p>
+          <a:p>
+            <a:pPr lvl="1"/>
+            <a:r>
+              <a:rPr lang="en-US" dirty="0" err="1" smtClean="0"/>
+              <a:t>Inhalt</a:t>
+            </a:r>
+            <a:r>
+              <a:rPr lang="en-US" dirty="0" smtClean="0"/>
+              <a:t>: </a:t>
+            </a:r>
+            <a:r>
+              <a:rPr lang="en-US" dirty="0" err="1" smtClean="0"/>
+              <a:t>Dynamisch</a:t>
+            </a:r>
+            <a:r>
+              <a:rPr lang="en-US" dirty="0" smtClean="0"/>
+              <a:t>, </a:t>
+            </a:r>
+            <a:r>
+              <a:rPr lang="en-US" dirty="0" err="1" smtClean="0"/>
+              <a:t>bestimmt</a:t>
+            </a:r>
+            <a:r>
+              <a:rPr lang="en-US" dirty="0" smtClean="0"/>
+              <a:t> </a:t>
+            </a:r>
+            <a:r>
+              <a:rPr lang="en-US" dirty="0" err="1" smtClean="0"/>
+              <a:t>durch</a:t>
+            </a:r>
+            <a:r>
+              <a:rPr lang="en-US" dirty="0" smtClean="0"/>
+              <a:t> </a:t>
+            </a:r>
+            <a:r>
+              <a:rPr lang="en-US" dirty="0" err="1" smtClean="0"/>
+              <a:t>Anwendung</a:t>
+            </a:r>
+            <a:r>
+              <a:rPr lang="en-US" dirty="0" smtClean="0"/>
+              <a:t> der </a:t>
+            </a:r>
+            <a:r>
+              <a:rPr lang="en-US" dirty="0" err="1" smtClean="0"/>
+              <a:t>Direktive</a:t>
+            </a:r>
+            <a:endParaRPr lang="de-AT" dirty="0" smtClean="0"/>
+          </a:p>
+          <a:p>
+            <a:pPr lvl="1"/>
+            <a:endParaRPr lang="en-US" dirty="0" smtClean="0"/>
           </a:p>
         </p:txBody>
       </p:sp>
@@ -35577,7 +35603,7 @@
     </p:spTree>
     <p:extLst>
       <p:ext uri="{BB962C8B-B14F-4D97-AF65-F5344CB8AC3E}">
-        <p14:creationId xmlns:p14="http://schemas.microsoft.com/office/powerpoint/2010/main" val="996991786"/>
+        <p14:creationId xmlns:p14="http://schemas.microsoft.com/office/powerpoint/2010/main" val="3939587667"/>
       </p:ext>
     </p:extLst>
   </p:cSld>
@@ -36456,6 +36482,148 @@
       <p:bldP spid="10" grpId="0" animBg="1"/>
       <p:bldP spid="11" grpId="0" animBg="1"/>
     </p:bldLst>
+  </p:timing>
+</p:sld>
+</file>
+
+<file path=ppt/slides/slide90.xml><?xml version="1.0" encoding="utf-8"?>
+<p:sld xmlns:a="http://schemas.openxmlformats.org/drawingml/2006/main" xmlns:r="http://schemas.openxmlformats.org/officeDocument/2006/relationships" xmlns:p="http://schemas.openxmlformats.org/presentationml/2006/main">
+  <p:cSld>
+    <p:spTree>
+      <p:nvGrpSpPr>
+        <p:cNvPr id="1" name=""/>
+        <p:cNvGrpSpPr/>
+        <p:nvPr/>
+      </p:nvGrpSpPr>
+      <p:grpSpPr>
+        <a:xfrm>
+          <a:off x="0" y="0"/>
+          <a:ext cx="0" cy="0"/>
+          <a:chOff x="0" y="0"/>
+          <a:chExt cx="0" cy="0"/>
+        </a:xfrm>
+      </p:grpSpPr>
+      <p:sp>
+        <p:nvSpPr>
+          <p:cNvPr id="2" name="Title 1"/>
+          <p:cNvSpPr>
+            <a:spLocks noGrp="1"/>
+          </p:cNvSpPr>
+          <p:nvPr>
+            <p:ph type="title"/>
+          </p:nvPr>
+        </p:nvSpPr>
+        <p:spPr/>
+        <p:txBody>
+          <a:bodyPr/>
+          <a:lstStyle/>
+          <a:p>
+            <a:r>
+              <a:rPr lang="en-US" dirty="0" err="1" smtClean="0"/>
+              <a:t>Transclusion</a:t>
+            </a:r>
+            <a:r>
+              <a:rPr lang="en-US" dirty="0" smtClean="0"/>
+              <a:t> Slots</a:t>
+            </a:r>
+            <a:endParaRPr lang="de-AT" dirty="0"/>
+          </a:p>
+        </p:txBody>
+      </p:sp>
+      <p:sp>
+        <p:nvSpPr>
+          <p:cNvPr id="3" name="Content Placeholder 2"/>
+          <p:cNvSpPr>
+            <a:spLocks noGrp="1"/>
+          </p:cNvSpPr>
+          <p:nvPr>
+            <p:ph sz="quarter" idx="12"/>
+          </p:nvPr>
+        </p:nvSpPr>
+        <p:spPr/>
+        <p:txBody>
+          <a:bodyPr/>
+          <a:lstStyle/>
+          <a:p>
+            <a:r>
+              <a:rPr lang="en-US" dirty="0" err="1" smtClean="0"/>
+              <a:t>Mehrere</a:t>
+            </a:r>
+            <a:r>
+              <a:rPr lang="en-US" dirty="0" smtClean="0"/>
+              <a:t> </a:t>
+            </a:r>
+            <a:r>
+              <a:rPr lang="en-US" dirty="0" err="1" smtClean="0"/>
+              <a:t>Transclusions</a:t>
+            </a:r>
+            <a:r>
+              <a:rPr lang="en-US" dirty="0" smtClean="0"/>
+              <a:t> pro directive</a:t>
+            </a:r>
+          </a:p>
+          <a:p>
+            <a:pPr lvl="1"/>
+            <a:r>
+              <a:rPr lang="en-US" dirty="0" smtClean="0"/>
+              <a:t>E.g. Title content, Body content</a:t>
+            </a:r>
+          </a:p>
+          <a:p>
+            <a:r>
+              <a:rPr lang="en-US" dirty="0" err="1" smtClean="0"/>
+              <a:t>Durch</a:t>
+            </a:r>
+            <a:r>
+              <a:rPr lang="en-US" dirty="0" smtClean="0"/>
+              <a:t> Name </a:t>
+            </a:r>
+            <a:r>
+              <a:rPr lang="en-US" dirty="0" err="1" smtClean="0"/>
+              <a:t>identifiziert</a:t>
+            </a:r>
+            <a:endParaRPr lang="de-AT" dirty="0"/>
+          </a:p>
+        </p:txBody>
+      </p:sp>
+      <p:sp>
+        <p:nvSpPr>
+          <p:cNvPr id="4" name="Text Placeholder 3"/>
+          <p:cNvSpPr>
+            <a:spLocks noGrp="1"/>
+          </p:cNvSpPr>
+          <p:nvPr>
+            <p:ph type="body" sz="quarter" idx="23"/>
+          </p:nvPr>
+        </p:nvSpPr>
+        <p:spPr/>
+        <p:txBody>
+          <a:bodyPr/>
+          <a:lstStyle/>
+          <a:p>
+            <a:endParaRPr lang="de-AT"/>
+          </a:p>
+        </p:txBody>
+      </p:sp>
+    </p:spTree>
+    <p:extLst>
+      <p:ext uri="{BB962C8B-B14F-4D97-AF65-F5344CB8AC3E}">
+        <p14:creationId xmlns:p14="http://schemas.microsoft.com/office/powerpoint/2010/main" val="996991786"/>
+      </p:ext>
+    </p:extLst>
+  </p:cSld>
+  <p:clrMapOvr>
+    <a:masterClrMapping/>
+  </p:clrMapOvr>
+  <p:transition spd="slow">
+    <p:push/>
+  </p:transition>
+  <p:timing>
+    <p:tnLst>
+      <p:par>
+        <p:cTn id="1" dur="indefinite" restart="never" nodeType="tmRoot"/>
+      </p:par>
+    </p:tnLst>
   </p:timing>
 </p:sld>
 </file>

</xml_diff>